<commit_message>
addition of pdf and ppt slides
Signed-off-by: Angela Ebirim <25156942+aebirim@users.noreply.github.com>
</commit_message>
<xml_diff>
--- a/THCHS_Covid_Data_Audit1_slides.pptx
+++ b/THCHS_Covid_Data_Audit1_slides.pptx
@@ -25838,8 +25838,8 @@
         </p:blipFill>
         <p:spPr>
           <a:xfrm>
-            <a:off x="2385480" y="1068480"/>
-            <a:ext cx="5839920" cy="3640320"/>
+            <a:off x="2059950" y="1068475"/>
+            <a:ext cx="6394050" cy="3640325"/>
           </a:xfrm>
           <a:prstGeom prst="rect">
             <a:avLst/>
@@ -25858,7 +25858,7 @@
         </p:nvSpPr>
         <p:spPr>
           <a:xfrm>
-            <a:off x="342840" y="2081880"/>
+            <a:off x="114240" y="1853280"/>
             <a:ext cx="2042400" cy="2532300"/>
           </a:xfrm>
           <a:prstGeom prst="rect">
@@ -26622,8 +26622,8 @@
         </p:blipFill>
         <p:spPr>
           <a:xfrm>
-            <a:off x="1636920" y="1122480"/>
-            <a:ext cx="5868000" cy="3657600"/>
+            <a:off x="1944800" y="1122475"/>
+            <a:ext cx="5560125" cy="3657600"/>
           </a:xfrm>
           <a:prstGeom prst="rect">
             <a:avLst/>
@@ -27109,8 +27109,8 @@
         </p:blipFill>
         <p:spPr>
           <a:xfrm>
-            <a:off x="1922880" y="1112640"/>
-            <a:ext cx="5891760" cy="3672360"/>
+            <a:off x="1922875" y="1112650"/>
+            <a:ext cx="6125049" cy="3672351"/>
           </a:xfrm>
           <a:prstGeom prst="rect">
             <a:avLst/>
@@ -29420,7 +29420,7 @@
             <a:tbl>
               <a:tblPr>
                 <a:noFill/>
-                <a:tableStyleId>{131FE4BB-8BAA-4C1F-B3D6-859D1A2DD484}</a:tableStyleId>
+                <a:tableStyleId>{4BCBD534-5E86-4250-B4D9-3FDDFC0ED40B}</a:tableStyleId>
               </a:tblPr>
               <a:tblGrid>
                 <a:gridCol w="1977800"/>
@@ -31248,7 +31248,7 @@
             <a:tbl>
               <a:tblPr>
                 <a:noFill/>
-                <a:tableStyleId>{131FE4BB-8BAA-4C1F-B3D6-859D1A2DD484}</a:tableStyleId>
+                <a:tableStyleId>{4BCBD534-5E86-4250-B4D9-3FDDFC0ED40B}</a:tableStyleId>
               </a:tblPr>
               <a:tblGrid>
                 <a:gridCol w="1393550"/>
@@ -35912,8 +35912,8 @@
         </p:blipFill>
         <p:spPr>
           <a:xfrm>
-            <a:off x="2443320" y="1188360"/>
-            <a:ext cx="5663160" cy="3529800"/>
+            <a:off x="2748120" y="1188360"/>
+            <a:ext cx="5663160" cy="3529801"/>
           </a:xfrm>
           <a:prstGeom prst="rect">
             <a:avLst/>
@@ -36036,8 +36036,8 @@
         </p:nvSpPr>
         <p:spPr>
           <a:xfrm>
-            <a:off x="560160" y="1714680"/>
-            <a:ext cx="1703160" cy="2229480"/>
+            <a:off x="941160" y="1714680"/>
+            <a:ext cx="1703100" cy="2229600"/>
           </a:xfrm>
           <a:prstGeom prst="rect">
             <a:avLst/>
@@ -36384,8 +36384,8 @@
         </p:blipFill>
         <p:spPr>
           <a:xfrm>
-            <a:off x="1780200" y="1118160"/>
-            <a:ext cx="5760360" cy="3590640"/>
+            <a:off x="2085000" y="1118160"/>
+            <a:ext cx="5760360" cy="3590639"/>
           </a:xfrm>
           <a:prstGeom prst="rect">
             <a:avLst/>
@@ -36404,8 +36404,8 @@
         </p:nvSpPr>
         <p:spPr>
           <a:xfrm>
-            <a:off x="114480" y="1232640"/>
-            <a:ext cx="1711800" cy="1691640"/>
+            <a:off x="343080" y="1232640"/>
+            <a:ext cx="1711800" cy="1691700"/>
           </a:xfrm>
           <a:prstGeom prst="rect">
             <a:avLst/>
@@ -36866,7 +36866,7 @@
         </p:blipFill>
         <p:spPr>
           <a:xfrm>
-            <a:off x="1589760" y="1016280"/>
+            <a:off x="1818360" y="1016280"/>
             <a:ext cx="6168600" cy="3845159"/>
           </a:xfrm>
           <a:prstGeom prst="rect">
@@ -37011,7 +37011,7 @@
         </p:nvSpPr>
         <p:spPr>
           <a:xfrm>
-            <a:off x="-38160" y="2386800"/>
+            <a:off x="190440" y="2386800"/>
             <a:ext cx="1622400" cy="2532300"/>
           </a:xfrm>
           <a:prstGeom prst="rect">

</xml_diff>